<commit_message>
Highlighted a few places
</commit_message>
<xml_diff>
--- a/CapstoneFinalPresentation_IPLT20CricketPredictions.pptx
+++ b/CapstoneFinalPresentation_IPLT20CricketPredictions.pptx
@@ -6588,7 +6588,7 @@
             </a:r>
             <a:r>
               <a:rPr lang="en-US" sz="1400" dirty="0"/>
-              <a:t> function to choose a linear model based on </a:t>
+              <a:t> function to choose a linear regression model based on </a:t>
             </a:r>
             <a:r>
               <a:rPr lang="en-US" sz="1400" b="1" dirty="0"/>
@@ -24759,7 +24759,7 @@
                     <a:p>
                       <a:pPr algn="ctr" fontAlgn="ctr"/>
                       <a:r>
-                        <a:rPr lang="en-US" sz="800" b="0" i="0" u="none" strike="noStrike">
+                        <a:rPr lang="en-US" sz="800" b="0" i="0" u="none" strike="noStrike" dirty="0">
                           <a:solidFill>
                             <a:srgbClr val="000000"/>
                           </a:solidFill>
@@ -36285,7 +36285,15 @@
             </a:pPr>
             <a:r>
               <a:rPr lang="en-US" sz="1400" dirty="0"/>
-              <a:t>But if 10 of their 11 batsmen are out, then the team’s innings is done, even if 20 overs are not complete. Start Innings 2. </a:t>
+              <a:t>But if 10 of their 11 batsmen are out, then the team’s innings is done, even if 20 overs are not complete. </a:t>
+            </a:r>
+            <a:r>
+              <a:rPr lang="en-US" sz="1400" b="1" dirty="0"/>
+              <a:t>Start Innings 2</a:t>
+            </a:r>
+            <a:r>
+              <a:rPr lang="en-US" sz="1400" dirty="0"/>
+              <a:t>. </a:t>
             </a:r>
           </a:p>
           <a:p>
@@ -36998,7 +37006,7 @@
             </a:pPr>
             <a:r>
               <a:rPr lang="en-US" sz="1400" dirty="0"/>
-              <a:t>Incorporate 2016 data into the Training dataset, and repeat test with 2017 as Test data</a:t>
+              <a:t>Incorporate 2016 data into the Training dataset, rebuild models, and repeat test with 2017 as Test data</a:t>
             </a:r>
           </a:p>
           <a:p>
@@ -37015,7 +37023,15 @@
             </a:pPr>
             <a:r>
               <a:rPr lang="en-US" sz="1400" dirty="0"/>
-              <a:t>With the predictive models tested over 3 seasons, 180 matches, acquire 2018 data (most current) from a </a:t>
+              <a:t>With the predictive </a:t>
+            </a:r>
+            <a:r>
+              <a:rPr lang="en-US" sz="1400"/>
+              <a:t>models refined over </a:t>
+            </a:r>
+            <a:r>
+              <a:rPr lang="en-US" sz="1400" dirty="0"/>
+              <a:t>3 seasons, 180 matches, acquire 2018 data (most current) from a </a:t>
             </a:r>
             <a:r>
               <a:rPr lang="en-US" sz="1400" b="1" dirty="0"/>

</xml_diff>

<commit_message>
Shiny package to take prediction to production
</commit_message>
<xml_diff>
--- a/CapstoneFinalPresentation_IPLT20CricketPredictions.pptx
+++ b/CapstoneFinalPresentation_IPLT20CricketPredictions.pptx
@@ -463,7 +463,7 @@
             <a:fld id="{B61BEF0D-F0BB-DE4B-95CE-6DB70DBA9567}" type="datetimeFigureOut">
               <a:rPr lang="en-US" dirty="0"/>
               <a:pPr/>
-              <a:t>10/18/2018</a:t>
+              <a:t>10/19/2018</a:t>
             </a:fld>
             <a:endParaRPr lang="en-US" dirty="0"/>
           </a:p>
@@ -784,7 +784,7 @@
             <a:fld id="{B61BEF0D-F0BB-DE4B-95CE-6DB70DBA9567}" type="datetimeFigureOut">
               <a:rPr lang="en-US" dirty="0"/>
               <a:pPr/>
-              <a:t>10/18/2018</a:t>
+              <a:t>10/19/2018</a:t>
             </a:fld>
             <a:endParaRPr lang="en-US" dirty="0"/>
           </a:p>
@@ -1029,7 +1029,7 @@
             <a:fld id="{B61BEF0D-F0BB-DE4B-95CE-6DB70DBA9567}" type="datetimeFigureOut">
               <a:rPr lang="en-US" dirty="0"/>
               <a:pPr/>
-              <a:t>10/18/2018</a:t>
+              <a:t>10/19/2018</a:t>
             </a:fld>
             <a:endParaRPr lang="en-US" dirty="0"/>
           </a:p>
@@ -1365,7 +1365,7 @@
             <a:fld id="{B61BEF0D-F0BB-DE4B-95CE-6DB70DBA9567}" type="datetimeFigureOut">
               <a:rPr lang="en-US" dirty="0"/>
               <a:pPr/>
-              <a:t>10/18/2018</a:t>
+              <a:t>10/19/2018</a:t>
             </a:fld>
             <a:endParaRPr lang="en-US" dirty="0"/>
           </a:p>
@@ -1709,7 +1709,7 @@
             <a:fld id="{B61BEF0D-F0BB-DE4B-95CE-6DB70DBA9567}" type="datetimeFigureOut">
               <a:rPr lang="en-US" dirty="0"/>
               <a:pPr/>
-              <a:t>10/18/2018</a:t>
+              <a:t>10/19/2018</a:t>
             </a:fld>
             <a:endParaRPr lang="en-US" dirty="0"/>
           </a:p>
@@ -2080,7 +2080,7 @@
             <a:fld id="{B61BEF0D-F0BB-DE4B-95CE-6DB70DBA9567}" type="datetimeFigureOut">
               <a:rPr lang="en-US" dirty="0"/>
               <a:pPr/>
-              <a:t>10/18/2018</a:t>
+              <a:t>10/19/2018</a:t>
             </a:fld>
             <a:endParaRPr lang="en-US" dirty="0"/>
           </a:p>
@@ -2547,7 +2547,7 @@
             <a:fld id="{B61BEF0D-F0BB-DE4B-95CE-6DB70DBA9567}" type="datetimeFigureOut">
               <a:rPr lang="en-US" dirty="0"/>
               <a:pPr/>
-              <a:t>10/18/2018</a:t>
+              <a:t>10/19/2018</a:t>
             </a:fld>
             <a:endParaRPr lang="en-US" dirty="0"/>
           </a:p>
@@ -2749,7 +2749,7 @@
             <a:fld id="{B61BEF0D-F0BB-DE4B-95CE-6DB70DBA9567}" type="datetimeFigureOut">
               <a:rPr lang="en-US" dirty="0"/>
               <a:pPr/>
-              <a:t>10/18/2018</a:t>
+              <a:t>10/19/2018</a:t>
             </a:fld>
             <a:endParaRPr lang="en-US" dirty="0"/>
           </a:p>
@@ -2957,7 +2957,7 @@
             <a:fld id="{B61BEF0D-F0BB-DE4B-95CE-6DB70DBA9567}" type="datetimeFigureOut">
               <a:rPr lang="en-US" dirty="0"/>
               <a:pPr/>
-              <a:t>10/18/2018</a:t>
+              <a:t>10/19/2018</a:t>
             </a:fld>
             <a:endParaRPr lang="en-US" dirty="0"/>
           </a:p>
@@ -3185,7 +3185,7 @@
           <a:p>
             <a:fld id="{05BFA754-D5C3-4E66-96A6-867B257F58DC}" type="datetimeFigureOut">
               <a:rPr lang="en-US" dirty="0"/>
-              <a:t>10/18/2018</a:t>
+              <a:t>10/19/2018</a:t>
             </a:fld>
             <a:endParaRPr lang="en-US" dirty="0"/>
           </a:p>
@@ -3429,7 +3429,7 @@
             <a:fld id="{B61BEF0D-F0BB-DE4B-95CE-6DB70DBA9567}" type="datetimeFigureOut">
               <a:rPr lang="en-US" dirty="0"/>
               <a:pPr/>
-              <a:t>10/18/2018</a:t>
+              <a:t>10/19/2018</a:t>
             </a:fld>
             <a:endParaRPr lang="en-US" dirty="0"/>
           </a:p>
@@ -3692,7 +3692,7 @@
           <a:p>
             <a:fld id="{05BFA754-D5C3-4E66-96A6-867B257F58DC}" type="datetimeFigureOut">
               <a:rPr lang="en-US" dirty="0"/>
-              <a:t>10/18/2018</a:t>
+              <a:t>10/19/2018</a:t>
             </a:fld>
             <a:endParaRPr lang="en-US" dirty="0"/>
           </a:p>
@@ -4101,7 +4101,7 @@
             <a:fld id="{B61BEF0D-F0BB-DE4B-95CE-6DB70DBA9567}" type="datetimeFigureOut">
               <a:rPr lang="en-US" dirty="0"/>
               <a:pPr/>
-              <a:t>10/18/2018</a:t>
+              <a:t>10/19/2018</a:t>
             </a:fld>
             <a:endParaRPr lang="en-US" dirty="0"/>
           </a:p>
@@ -4247,7 +4247,7 @@
             <a:fld id="{B61BEF0D-F0BB-DE4B-95CE-6DB70DBA9567}" type="datetimeFigureOut">
               <a:rPr lang="en-US" dirty="0"/>
               <a:pPr/>
-              <a:t>10/18/2018</a:t>
+              <a:t>10/19/2018</a:t>
             </a:fld>
             <a:endParaRPr lang="en-US" dirty="0"/>
           </a:p>
@@ -4370,7 +4370,7 @@
             <a:fld id="{B61BEF0D-F0BB-DE4B-95CE-6DB70DBA9567}" type="datetimeFigureOut">
               <a:rPr lang="en-US" dirty="0"/>
               <a:pPr/>
-              <a:t>10/18/2018</a:t>
+              <a:t>10/19/2018</a:t>
             </a:fld>
             <a:endParaRPr lang="en-US" dirty="0"/>
           </a:p>
@@ -4622,7 +4622,7 @@
             <a:fld id="{B61BEF0D-F0BB-DE4B-95CE-6DB70DBA9567}" type="datetimeFigureOut">
               <a:rPr lang="en-US" dirty="0"/>
               <a:pPr/>
-              <a:t>10/18/2018</a:t>
+              <a:t>10/19/2018</a:t>
             </a:fld>
             <a:endParaRPr lang="en-US" dirty="0"/>
           </a:p>
@@ -4934,7 +4934,7 @@
             <a:fld id="{B61BEF0D-F0BB-DE4B-95CE-6DB70DBA9567}" type="datetimeFigureOut">
               <a:rPr lang="en-US" dirty="0"/>
               <a:pPr/>
-              <a:t>10/18/2018</a:t>
+              <a:t>10/19/2018</a:t>
             </a:fld>
             <a:endParaRPr lang="en-US" dirty="0"/>
           </a:p>
@@ -5282,7 +5282,7 @@
             <a:fld id="{B61BEF0D-F0BB-DE4B-95CE-6DB70DBA9567}" type="datetimeFigureOut">
               <a:rPr lang="en-US" dirty="0"/>
               <a:pPr/>
-              <a:t>10/18/2018</a:t>
+              <a:t>10/19/2018</a:t>
             </a:fld>
             <a:endParaRPr lang="en-US" dirty="0"/>
           </a:p>
@@ -35779,7 +35779,7 @@
         <p:spPr>
           <a:xfrm>
             <a:off x="806741" y="1675055"/>
-            <a:ext cx="10578518" cy="2862322"/>
+            <a:ext cx="10578518" cy="4247317"/>
           </a:xfrm>
           <a:prstGeom prst="rect">
             <a:avLst/>
@@ -35816,7 +35816,7 @@
             </a:pPr>
             <a:r>
               <a:rPr lang="en-US" dirty="0"/>
-              <a:t>Let the band start off wide and get narrower as the match progresses</a:t>
+              <a:t>Let the band start off wide and get narrower as the match progresses (15 runs -&gt; 10 -&gt; 5 runs)</a:t>
             </a:r>
           </a:p>
           <a:p>
@@ -35852,6 +35852,61 @@
             <a:r>
               <a:rPr lang="en-US" dirty="0"/>
               <a:t>Playing at home vs playing away</a:t>
+            </a:r>
+          </a:p>
+          <a:p>
+            <a:pPr marL="742950" lvl="1" indent="-285750">
+              <a:buFont typeface="Arial" panose="020B0604020202020204" pitchFamily="34" charset="0"/>
+              <a:buChar char="•"/>
+            </a:pPr>
+            <a:endParaRPr lang="en-US" dirty="0"/>
+          </a:p>
+          <a:p>
+            <a:pPr marL="285750" indent="-285750">
+              <a:buFont typeface="Arial" panose="020B0604020202020204" pitchFamily="34" charset="0"/>
+              <a:buChar char="•"/>
+            </a:pPr>
+            <a:r>
+              <a:rPr lang="en-US" dirty="0"/>
+              <a:t>Try to “</a:t>
+            </a:r>
+            <a:r>
+              <a:rPr lang="en-US" dirty="0" err="1"/>
+              <a:t>productionalize</a:t>
+            </a:r>
+            <a:r>
+              <a:rPr lang="en-US" dirty="0"/>
+              <a:t>” the prediction engine</a:t>
+            </a:r>
+          </a:p>
+          <a:p>
+            <a:pPr marL="742950" lvl="1" indent="-285750">
+              <a:buFont typeface="Arial" panose="020B0604020202020204" pitchFamily="34" charset="0"/>
+              <a:buChar char="•"/>
+            </a:pPr>
+            <a:r>
+              <a:rPr lang="en-US" dirty="0"/>
+              <a:t>Set up a server to get automated feeds during each IPM match </a:t>
+            </a:r>
+          </a:p>
+          <a:p>
+            <a:pPr marL="742950" lvl="1" indent="-285750">
+              <a:buFont typeface="Arial" panose="020B0604020202020204" pitchFamily="34" charset="0"/>
+              <a:buChar char="•"/>
+            </a:pPr>
+            <a:r>
+              <a:rPr lang="en-US" dirty="0"/>
+              <a:t>Set up to run predictions at identified stages of each match</a:t>
+            </a:r>
+          </a:p>
+          <a:p>
+            <a:pPr marL="1200150" lvl="2" indent="-285750">
+              <a:buFont typeface="Arial" panose="020B0604020202020204" pitchFamily="34" charset="0"/>
+              <a:buChar char="•"/>
+            </a:pPr>
+            <a:r>
+              <a:rPr lang="en-US" dirty="0"/>
+              <a:t>Use Shiny package in R to host interactive, standalone app on a webpage and build dashboards</a:t>
             </a:r>
           </a:p>
           <a:p>

</xml_diff>

<commit_message>
Made wickets lost non-fraction
</commit_message>
<xml_diff>
--- a/CapstoneFinalPresentation_IPLT20CricketPredictions.pptx
+++ b/CapstoneFinalPresentation_IPLT20CricketPredictions.pptx
@@ -6362,10 +6362,10 @@
       </p:sp>
       <p:pic>
         <p:nvPicPr>
-          <p:cNvPr id="4" name="Picture 3">
+          <p:cNvPr id="3" name="Picture 2">
             <a:extLst>
               <a:ext uri="{FF2B5EF4-FFF2-40B4-BE49-F238E27FC236}">
-                <a16:creationId xmlns:a16="http://schemas.microsoft.com/office/drawing/2014/main" id="{6296B9EC-8084-4533-8062-4AE975478228}"/>
+                <a16:creationId xmlns:a16="http://schemas.microsoft.com/office/drawing/2014/main" id="{FAD77645-DD47-4ADD-B17B-B5F65E8C5463}"/>
               </a:ext>
             </a:extLst>
           </p:cNvPr>
@@ -6382,8 +6382,8 @@
         </p:blipFill>
         <p:spPr>
           <a:xfrm>
-            <a:off x="825012" y="1288383"/>
-            <a:ext cx="10541976" cy="5061464"/>
+            <a:off x="978710" y="1236435"/>
+            <a:ext cx="10402334" cy="4812673"/>
           </a:xfrm>
           <a:prstGeom prst="rect">
             <a:avLst/>

</xml_diff>